<commit_message>
Added 1 slide to PPT on questions to explore
</commit_message>
<xml_diff>
--- a/WebScraping_Presentation_Joe_Lu.pptx
+++ b/WebScraping_Presentation_Joe_Lu.pptx
@@ -6,29 +6,30 @@
   </p:sldMasterIdLst>
   <p:sldIdLst>
     <p:sldId id="281" r:id="rId2"/>
-    <p:sldId id="258" r:id="rId3"/>
-    <p:sldId id="256" r:id="rId4"/>
-    <p:sldId id="268" r:id="rId5"/>
-    <p:sldId id="257" r:id="rId6"/>
-    <p:sldId id="260" r:id="rId7"/>
-    <p:sldId id="261" r:id="rId8"/>
-    <p:sldId id="262" r:id="rId9"/>
-    <p:sldId id="263" r:id="rId10"/>
-    <p:sldId id="264" r:id="rId11"/>
-    <p:sldId id="266" r:id="rId12"/>
-    <p:sldId id="265" r:id="rId13"/>
-    <p:sldId id="267" r:id="rId14"/>
-    <p:sldId id="269" r:id="rId15"/>
-    <p:sldId id="270" r:id="rId16"/>
-    <p:sldId id="273" r:id="rId17"/>
-    <p:sldId id="274" r:id="rId18"/>
-    <p:sldId id="275" r:id="rId19"/>
-    <p:sldId id="276" r:id="rId20"/>
-    <p:sldId id="271" r:id="rId21"/>
-    <p:sldId id="277" r:id="rId22"/>
-    <p:sldId id="278" r:id="rId23"/>
-    <p:sldId id="279" r:id="rId24"/>
-    <p:sldId id="280" r:id="rId25"/>
+    <p:sldId id="282" r:id="rId3"/>
+    <p:sldId id="258" r:id="rId4"/>
+    <p:sldId id="256" r:id="rId5"/>
+    <p:sldId id="268" r:id="rId6"/>
+    <p:sldId id="257" r:id="rId7"/>
+    <p:sldId id="260" r:id="rId8"/>
+    <p:sldId id="261" r:id="rId9"/>
+    <p:sldId id="262" r:id="rId10"/>
+    <p:sldId id="263" r:id="rId11"/>
+    <p:sldId id="264" r:id="rId12"/>
+    <p:sldId id="266" r:id="rId13"/>
+    <p:sldId id="265" r:id="rId14"/>
+    <p:sldId id="267" r:id="rId15"/>
+    <p:sldId id="269" r:id="rId16"/>
+    <p:sldId id="270" r:id="rId17"/>
+    <p:sldId id="273" r:id="rId18"/>
+    <p:sldId id="274" r:id="rId19"/>
+    <p:sldId id="275" r:id="rId20"/>
+    <p:sldId id="276" r:id="rId21"/>
+    <p:sldId id="271" r:id="rId22"/>
+    <p:sldId id="277" r:id="rId23"/>
+    <p:sldId id="278" r:id="rId24"/>
+    <p:sldId id="279" r:id="rId25"/>
+    <p:sldId id="280" r:id="rId26"/>
   </p:sldIdLst>
   <p:sldSz cx="9144000" cy="6858000" type="screen4x3"/>
   <p:notesSz cx="6858000" cy="9144000"/>
@@ -133,6 +134,7 @@
         <p14:section name="Default Section" id="{11BE1052-121B-4F90-891E-3E7F36620DA5}">
           <p14:sldIdLst>
             <p14:sldId id="281"/>
+            <p14:sldId id="282"/>
             <p14:sldId id="258"/>
             <p14:sldId id="256"/>
             <p14:sldId id="268"/>
@@ -345,7 +347,7 @@
           <a:p>
             <a:fld id="{7831E811-4D0D-41F5-92BC-54B17944F109}" type="datetimeFigureOut">
               <a:rPr lang="en-US" smtClean="0"/>
-              <a:t>1/26/2020</a:t>
+              <a:t>1/27/2020</a:t>
             </a:fld>
             <a:endParaRPr lang="en-US"/>
           </a:p>
@@ -515,7 +517,7 @@
           <a:p>
             <a:fld id="{7831E811-4D0D-41F5-92BC-54B17944F109}" type="datetimeFigureOut">
               <a:rPr lang="en-US" smtClean="0"/>
-              <a:t>1/26/2020</a:t>
+              <a:t>1/27/2020</a:t>
             </a:fld>
             <a:endParaRPr lang="en-US"/>
           </a:p>
@@ -695,7 +697,7 @@
           <a:p>
             <a:fld id="{7831E811-4D0D-41F5-92BC-54B17944F109}" type="datetimeFigureOut">
               <a:rPr lang="en-US" smtClean="0"/>
-              <a:t>1/26/2020</a:t>
+              <a:t>1/27/2020</a:t>
             </a:fld>
             <a:endParaRPr lang="en-US"/>
           </a:p>
@@ -865,7 +867,7 @@
           <a:p>
             <a:fld id="{7831E811-4D0D-41F5-92BC-54B17944F109}" type="datetimeFigureOut">
               <a:rPr lang="en-US" smtClean="0"/>
-              <a:t>1/26/2020</a:t>
+              <a:t>1/27/2020</a:t>
             </a:fld>
             <a:endParaRPr lang="en-US"/>
           </a:p>
@@ -1111,7 +1113,7 @@
           <a:p>
             <a:fld id="{7831E811-4D0D-41F5-92BC-54B17944F109}" type="datetimeFigureOut">
               <a:rPr lang="en-US" smtClean="0"/>
-              <a:t>1/26/2020</a:t>
+              <a:t>1/27/2020</a:t>
             </a:fld>
             <a:endParaRPr lang="en-US"/>
           </a:p>
@@ -1399,7 +1401,7 @@
           <a:p>
             <a:fld id="{7831E811-4D0D-41F5-92BC-54B17944F109}" type="datetimeFigureOut">
               <a:rPr lang="en-US" smtClean="0"/>
-              <a:t>1/26/2020</a:t>
+              <a:t>1/27/2020</a:t>
             </a:fld>
             <a:endParaRPr lang="en-US"/>
           </a:p>
@@ -1821,7 +1823,7 @@
           <a:p>
             <a:fld id="{7831E811-4D0D-41F5-92BC-54B17944F109}" type="datetimeFigureOut">
               <a:rPr lang="en-US" smtClean="0"/>
-              <a:t>1/26/2020</a:t>
+              <a:t>1/27/2020</a:t>
             </a:fld>
             <a:endParaRPr lang="en-US"/>
           </a:p>
@@ -1939,7 +1941,7 @@
           <a:p>
             <a:fld id="{7831E811-4D0D-41F5-92BC-54B17944F109}" type="datetimeFigureOut">
               <a:rPr lang="en-US" smtClean="0"/>
-              <a:t>1/26/2020</a:t>
+              <a:t>1/27/2020</a:t>
             </a:fld>
             <a:endParaRPr lang="en-US"/>
           </a:p>
@@ -2034,7 +2036,7 @@
           <a:p>
             <a:fld id="{7831E811-4D0D-41F5-92BC-54B17944F109}" type="datetimeFigureOut">
               <a:rPr lang="en-US" smtClean="0"/>
-              <a:t>1/26/2020</a:t>
+              <a:t>1/27/2020</a:t>
             </a:fld>
             <a:endParaRPr lang="en-US"/>
           </a:p>
@@ -2311,7 +2313,7 @@
           <a:p>
             <a:fld id="{7831E811-4D0D-41F5-92BC-54B17944F109}" type="datetimeFigureOut">
               <a:rPr lang="en-US" smtClean="0"/>
-              <a:t>1/26/2020</a:t>
+              <a:t>1/27/2020</a:t>
             </a:fld>
             <a:endParaRPr lang="en-US"/>
           </a:p>
@@ -2564,7 +2566,7 @@
           <a:p>
             <a:fld id="{7831E811-4D0D-41F5-92BC-54B17944F109}" type="datetimeFigureOut">
               <a:rPr lang="en-US" smtClean="0"/>
-              <a:t>1/26/2020</a:t>
+              <a:t>1/27/2020</a:t>
             </a:fld>
             <a:endParaRPr lang="en-US"/>
           </a:p>
@@ -2777,7 +2779,7 @@
           <a:p>
             <a:fld id="{7831E811-4D0D-41F5-92BC-54B17944F109}" type="datetimeFigureOut">
               <a:rPr lang="en-US" smtClean="0"/>
-              <a:t>1/26/2020</a:t>
+              <a:t>1/27/2020</a:t>
             </a:fld>
             <a:endParaRPr lang="en-US"/>
           </a:p>
@@ -3320,6 +3322,186 @@
                   <a:srgbClr val="0070C0"/>
                 </a:solidFill>
               </a:rPr>
+              <a:t>Aug 25, 2019: Trump regrets not raising tariffs higher on China</a:t>
+            </a:r>
+            <a:endParaRPr lang="en-US" dirty="0">
+              <a:solidFill>
+                <a:srgbClr val="0070C0"/>
+              </a:solidFill>
+            </a:endParaRPr>
+          </a:p>
+        </p:txBody>
+      </p:sp>
+      <p:pic>
+        <p:nvPicPr>
+          <p:cNvPr id="6146" name="Picture 2" descr="C:\MAIN\NYCDSA\Web_Scraping_Project\Graphic - Appearance of word china.png"/>
+          <p:cNvPicPr>
+            <a:picLocks noChangeAspect="1" noChangeArrowheads="1"/>
+          </p:cNvPicPr>
+          <p:nvPr/>
+        </p:nvPicPr>
+        <p:blipFill>
+          <a:blip r:embed="rId2">
+            <a:extLst>
+              <a:ext uri="{28A0092B-C50C-407E-A947-70E740481C1C}">
+                <a14:useLocalDpi xmlns:a14="http://schemas.microsoft.com/office/drawing/2010/main" val="0"/>
+              </a:ext>
+            </a:extLst>
+          </a:blip>
+          <a:srcRect/>
+          <a:stretch>
+            <a:fillRect/>
+          </a:stretch>
+        </p:blipFill>
+        <p:spPr bwMode="auto">
+          <a:xfrm>
+            <a:off x="0" y="76200"/>
+            <a:ext cx="9067800" cy="5800497"/>
+          </a:xfrm>
+          <a:prstGeom prst="rect">
+            <a:avLst/>
+          </a:prstGeom>
+          <a:noFill/>
+          <a:extLst>
+            <a:ext uri="{909E8E84-426E-40DD-AFC4-6F175D3DCCD1}">
+              <a14:hiddenFill xmlns:a14="http://schemas.microsoft.com/office/drawing/2010/main">
+                <a:solidFill>
+                  <a:srgbClr val="FFFFFF"/>
+                </a:solidFill>
+              </a14:hiddenFill>
+            </a:ext>
+          </a:extLst>
+        </p:spPr>
+      </p:pic>
+      <p:pic>
+        <p:nvPicPr>
+          <p:cNvPr id="5" name="Picture 2"/>
+          <p:cNvPicPr>
+            <a:picLocks noChangeAspect="1" noChangeArrowheads="1"/>
+          </p:cNvPicPr>
+          <p:nvPr/>
+        </p:nvPicPr>
+        <p:blipFill>
+          <a:blip r:embed="rId3">
+            <a:extLst>
+              <a:ext uri="{28A0092B-C50C-407E-A947-70E740481C1C}">
+                <a14:useLocalDpi xmlns:a14="http://schemas.microsoft.com/office/drawing/2010/main" val="0"/>
+              </a:ext>
+            </a:extLst>
+          </a:blip>
+          <a:srcRect/>
+          <a:stretch>
+            <a:fillRect/>
+          </a:stretch>
+        </p:blipFill>
+        <p:spPr bwMode="auto">
+          <a:xfrm>
+            <a:off x="7467600" y="457200"/>
+            <a:ext cx="1428750" cy="1428750"/>
+          </a:xfrm>
+          <a:prstGeom prst="rect">
+            <a:avLst/>
+          </a:prstGeom>
+          <a:noFill/>
+          <a:ln>
+            <a:noFill/>
+          </a:ln>
+          <a:effectLst/>
+          <a:extLst>
+            <a:ext uri="{909E8E84-426E-40DD-AFC4-6F175D3DCCD1}">
+              <a14:hiddenFill xmlns:a14="http://schemas.microsoft.com/office/drawing/2010/main">
+                <a:solidFill>
+                  <a:schemeClr val="accent1"/>
+                </a:solidFill>
+              </a14:hiddenFill>
+            </a:ext>
+            <a:ext uri="{91240B29-F687-4F45-9708-019B960494DF}">
+              <a14:hiddenLine xmlns:a14="http://schemas.microsoft.com/office/drawing/2010/main" w="9525">
+                <a:solidFill>
+                  <a:schemeClr val="tx1"/>
+                </a:solidFill>
+                <a:miter lim="800000"/>
+                <a:headEnd/>
+                <a:tailEnd/>
+              </a14:hiddenLine>
+            </a:ext>
+            <a:ext uri="{AF507438-7753-43E0-B8FC-AC1667EBCBE1}">
+              <a14:hiddenEffects xmlns:a14="http://schemas.microsoft.com/office/drawing/2010/main">
+                <a:effectLst>
+                  <a:outerShdw dist="35921" dir="2700000" algn="ctr" rotWithShape="0">
+                    <a:schemeClr val="bg2"/>
+                  </a:outerShdw>
+                </a:effectLst>
+              </a14:hiddenEffects>
+            </a:ext>
+          </a:extLst>
+        </p:spPr>
+      </p:pic>
+    </p:spTree>
+    <p:extLst>
+      <p:ext uri="{BB962C8B-B14F-4D97-AF65-F5344CB8AC3E}">
+        <p14:creationId xmlns:p14="http://schemas.microsoft.com/office/powerpoint/2010/main" val="3752115146"/>
+      </p:ext>
+    </p:extLst>
+  </p:cSld>
+  <p:clrMapOvr>
+    <a:masterClrMapping/>
+  </p:clrMapOvr>
+  <p:timing>
+    <p:tnLst>
+      <p:par>
+        <p:cTn id="1" dur="indefinite" restart="never" nodeType="tmRoot"/>
+      </p:par>
+    </p:tnLst>
+  </p:timing>
+</p:sld>
+</file>
+
+<file path=ppt/slides/slide11.xml><?xml version="1.0" encoding="utf-8"?>
+<p:sld xmlns:a="http://schemas.openxmlformats.org/drawingml/2006/main" xmlns:r="http://schemas.openxmlformats.org/officeDocument/2006/relationships" xmlns:p="http://schemas.openxmlformats.org/presentationml/2006/main">
+  <p:cSld>
+    <p:spTree>
+      <p:nvGrpSpPr>
+        <p:cNvPr id="1" name=""/>
+        <p:cNvGrpSpPr/>
+        <p:nvPr/>
+      </p:nvGrpSpPr>
+      <p:grpSpPr>
+        <a:xfrm>
+          <a:off x="0" y="0"/>
+          <a:ext cx="0" cy="0"/>
+          <a:chOff x="0" y="0"/>
+          <a:chExt cx="0" cy="0"/>
+        </a:xfrm>
+      </p:grpSpPr>
+      <p:sp>
+        <p:nvSpPr>
+          <p:cNvPr id="7" name="Content Placeholder 6"/>
+          <p:cNvSpPr>
+            <a:spLocks noGrp="1"/>
+          </p:cNvSpPr>
+          <p:nvPr>
+            <p:ph idx="1"/>
+          </p:nvPr>
+        </p:nvSpPr>
+        <p:spPr>
+          <a:xfrm>
+            <a:off x="417455" y="5829014"/>
+            <a:ext cx="8229600" cy="1020763"/>
+          </a:xfrm>
+        </p:spPr>
+        <p:txBody>
+          <a:bodyPr>
+            <a:normAutofit lnSpcReduction="10000"/>
+          </a:bodyPr>
+          <a:lstStyle/>
+          <a:p>
+            <a:r>
+              <a:rPr lang="en-US" dirty="0" smtClean="0">
+                <a:solidFill>
+                  <a:srgbClr val="0070C0"/>
+                </a:solidFill>
+              </a:rPr>
               <a:t>Mid Dec 2019: Boeing halts 737 Max production</a:t>
             </a:r>
             <a:endParaRPr lang="en-US" dirty="0">
@@ -3455,7 +3637,7 @@
 </p:sld>
 </file>
 
-<file path=ppt/slides/slide11.xml><?xml version="1.0" encoding="utf-8"?>
+<file path=ppt/slides/slide12.xml><?xml version="1.0" encoding="utf-8"?>
 <p:sld xmlns:a="http://schemas.openxmlformats.org/drawingml/2006/main" xmlns:r="http://schemas.openxmlformats.org/officeDocument/2006/relationships" xmlns:p="http://schemas.openxmlformats.org/presentationml/2006/main">
   <p:cSld>
     <p:bg>
@@ -4068,7 +4250,7 @@
 </p:sld>
 </file>
 
-<file path=ppt/slides/slide12.xml><?xml version="1.0" encoding="utf-8"?>
+<file path=ppt/slides/slide13.xml><?xml version="1.0" encoding="utf-8"?>
 <p:sld xmlns:a="http://schemas.openxmlformats.org/drawingml/2006/main" xmlns:r="http://schemas.openxmlformats.org/officeDocument/2006/relationships" xmlns:p="http://schemas.openxmlformats.org/presentationml/2006/main">
   <p:cSld>
     <p:spTree>
@@ -4373,7 +4555,7 @@
 </p:sld>
 </file>
 
-<file path=ppt/slides/slide13.xml><?xml version="1.0" encoding="utf-8"?>
+<file path=ppt/slides/slide14.xml><?xml version="1.0" encoding="utf-8"?>
 <p:sld xmlns:a="http://schemas.openxmlformats.org/drawingml/2006/main" xmlns:r="http://schemas.openxmlformats.org/officeDocument/2006/relationships" xmlns:p="http://schemas.openxmlformats.org/presentationml/2006/main">
   <p:cSld>
     <p:spTree>
@@ -4492,7 +4674,7 @@
 </p:sld>
 </file>
 
-<file path=ppt/slides/slide14.xml><?xml version="1.0" encoding="utf-8"?>
+<file path=ppt/slides/slide15.xml><?xml version="1.0" encoding="utf-8"?>
 <p:sld xmlns:a="http://schemas.openxmlformats.org/drawingml/2006/main" xmlns:r="http://schemas.openxmlformats.org/officeDocument/2006/relationships" xmlns:p="http://schemas.openxmlformats.org/presentationml/2006/main">
   <p:cSld>
     <p:spTree>
@@ -4688,7 +4870,7 @@
 </p:sld>
 </file>
 
-<file path=ppt/slides/slide15.xml><?xml version="1.0" encoding="utf-8"?>
+<file path=ppt/slides/slide16.xml><?xml version="1.0" encoding="utf-8"?>
 <p:sld xmlns:a="http://schemas.openxmlformats.org/drawingml/2006/main" xmlns:r="http://schemas.openxmlformats.org/officeDocument/2006/relationships" xmlns:p="http://schemas.openxmlformats.org/presentationml/2006/main" showMasterSp="0">
   <p:cSld>
     <p:bg>
@@ -4917,245 +5099,6 @@
     <p:extLst>
       <p:ext uri="{BB962C8B-B14F-4D97-AF65-F5344CB8AC3E}">
         <p14:creationId xmlns:p14="http://schemas.microsoft.com/office/powerpoint/2010/main" val="2980943376"/>
-      </p:ext>
-    </p:extLst>
-  </p:cSld>
-  <p:clrMapOvr>
-    <a:masterClrMapping/>
-  </p:clrMapOvr>
-  <p:timing>
-    <p:tnLst>
-      <p:par>
-        <p:cTn id="1" dur="indefinite" restart="never" nodeType="tmRoot"/>
-      </p:par>
-    </p:tnLst>
-  </p:timing>
-</p:sld>
-</file>
-
-<file path=ppt/slides/slide16.xml><?xml version="1.0" encoding="utf-8"?>
-<p:sld xmlns:a="http://schemas.openxmlformats.org/drawingml/2006/main" xmlns:r="http://schemas.openxmlformats.org/officeDocument/2006/relationships" xmlns:p="http://schemas.openxmlformats.org/presentationml/2006/main">
-  <p:cSld>
-    <p:bg>
-      <p:bgPr>
-        <a:blipFill dpi="0" rotWithShape="1">
-          <a:blip r:embed="rId2">
-            <a:lum/>
-          </a:blip>
-          <a:srcRect/>
-          <a:stretch>
-            <a:fillRect l="-7000" r="-7000"/>
-          </a:stretch>
-        </a:blipFill>
-        <a:effectLst/>
-      </p:bgPr>
-    </p:bg>
-    <p:spTree>
-      <p:nvGrpSpPr>
-        <p:cNvPr id="1" name=""/>
-        <p:cNvGrpSpPr/>
-        <p:nvPr/>
-      </p:nvGrpSpPr>
-      <p:grpSpPr>
-        <a:xfrm>
-          <a:off x="0" y="0"/>
-          <a:ext cx="0" cy="0"/>
-          <a:chOff x="0" y="0"/>
-          <a:chExt cx="0" cy="0"/>
-        </a:xfrm>
-      </p:grpSpPr>
-      <p:sp>
-        <p:nvSpPr>
-          <p:cNvPr id="2" name="Title 1"/>
-          <p:cNvSpPr>
-            <a:spLocks noGrp="1"/>
-          </p:cNvSpPr>
-          <p:nvPr>
-            <p:ph type="title"/>
-          </p:nvPr>
-        </p:nvSpPr>
-        <p:spPr/>
-        <p:txBody>
-          <a:bodyPr/>
-          <a:lstStyle/>
-          <a:p>
-            <a:r>
-              <a:rPr lang="en-US" dirty="0" smtClean="0">
-                <a:solidFill>
-                  <a:srgbClr val="0070C0"/>
-                </a:solidFill>
-              </a:rPr>
-              <a:t>Tell K-Means to find 10 categories</a:t>
-            </a:r>
-            <a:endParaRPr lang="en-US" dirty="0">
-              <a:solidFill>
-                <a:srgbClr val="0070C0"/>
-              </a:solidFill>
-            </a:endParaRPr>
-          </a:p>
-        </p:txBody>
-      </p:sp>
-      <p:sp>
-        <p:nvSpPr>
-          <p:cNvPr id="3" name="Content Placeholder 2"/>
-          <p:cNvSpPr>
-            <a:spLocks noGrp="1"/>
-          </p:cNvSpPr>
-          <p:nvPr>
-            <p:ph idx="1"/>
-          </p:nvPr>
-        </p:nvSpPr>
-        <p:spPr>
-          <a:xfrm>
-            <a:off x="457200" y="1600200"/>
-            <a:ext cx="8229600" cy="4876800"/>
-          </a:xfrm>
-        </p:spPr>
-        <p:txBody>
-          <a:bodyPr>
-            <a:normAutofit/>
-          </a:bodyPr>
-          <a:lstStyle/>
-          <a:p>
-            <a:r>
-              <a:rPr lang="en-US" dirty="0" smtClean="0">
-                <a:solidFill>
-                  <a:srgbClr val="0070C0"/>
-                </a:solidFill>
-              </a:rPr>
-              <a:t>Category 2:</a:t>
-            </a:r>
-          </a:p>
-          <a:p>
-            <a:pPr lvl="1"/>
-            <a:r>
-              <a:rPr lang="en-US" dirty="0" smtClean="0">
-                <a:solidFill>
-                  <a:srgbClr val="0070C0"/>
-                </a:solidFill>
-              </a:rPr>
-              <a:t>“oil”: 147 times</a:t>
-            </a:r>
-          </a:p>
-          <a:p>
-            <a:pPr lvl="1"/>
-            <a:r>
-              <a:rPr lang="en-US" dirty="0" smtClean="0">
-                <a:solidFill>
-                  <a:srgbClr val="0070C0"/>
-                </a:solidFill>
-              </a:rPr>
-              <a:t>“</a:t>
-            </a:r>
-            <a:r>
-              <a:rPr lang="en-US" dirty="0" err="1" smtClean="0">
-                <a:solidFill>
-                  <a:srgbClr val="0070C0"/>
-                </a:solidFill>
-              </a:rPr>
-              <a:t>saudi</a:t>
-            </a:r>
-            <a:r>
-              <a:rPr lang="en-US" dirty="0" smtClean="0">
-                <a:solidFill>
-                  <a:srgbClr val="0070C0"/>
-                </a:solidFill>
-              </a:rPr>
-              <a:t>”: 42</a:t>
-            </a:r>
-          </a:p>
-          <a:p>
-            <a:pPr lvl="1"/>
-            <a:r>
-              <a:rPr lang="en-US" dirty="0" smtClean="0">
-                <a:solidFill>
-                  <a:srgbClr val="0070C0"/>
-                </a:solidFill>
-              </a:rPr>
-              <a:t>“crude”: 31</a:t>
-            </a:r>
-          </a:p>
-          <a:p>
-            <a:pPr lvl="1"/>
-            <a:r>
-              <a:rPr lang="en-US" dirty="0" smtClean="0">
-                <a:solidFill>
-                  <a:srgbClr val="0070C0"/>
-                </a:solidFill>
-              </a:rPr>
-              <a:t>“</a:t>
-            </a:r>
-            <a:r>
-              <a:rPr lang="en-US" dirty="0" err="1" smtClean="0">
-                <a:solidFill>
-                  <a:srgbClr val="0070C0"/>
-                </a:solidFill>
-              </a:rPr>
-              <a:t>opec</a:t>
-            </a:r>
-            <a:r>
-              <a:rPr lang="en-US" dirty="0" smtClean="0">
-                <a:solidFill>
-                  <a:srgbClr val="0070C0"/>
-                </a:solidFill>
-              </a:rPr>
-              <a:t>”: 25</a:t>
-            </a:r>
-          </a:p>
-          <a:p>
-            <a:pPr lvl="1"/>
-            <a:r>
-              <a:rPr lang="en-US" dirty="0" smtClean="0">
-                <a:solidFill>
-                  <a:srgbClr val="0070C0"/>
-                </a:solidFill>
-              </a:rPr>
-              <a:t>Ex: “Oil slides 2% as glut forecast…”</a:t>
-            </a:r>
-          </a:p>
-          <a:p>
-            <a:pPr lvl="1"/>
-            <a:r>
-              <a:rPr lang="en-US" dirty="0" smtClean="0">
-                <a:solidFill>
-                  <a:srgbClr val="0070C0"/>
-                </a:solidFill>
-              </a:rPr>
-              <a:t>Ex: “Oil edges up after five days of losses…”</a:t>
-            </a:r>
-          </a:p>
-          <a:p>
-            <a:pPr lvl="1"/>
-            <a:r>
-              <a:rPr lang="en-US" dirty="0" smtClean="0">
-                <a:solidFill>
-                  <a:srgbClr val="0070C0"/>
-                </a:solidFill>
-              </a:rPr>
-              <a:t>Ex: “Divergent paths: Oil, natural gas going different…”</a:t>
-            </a:r>
-          </a:p>
-          <a:p>
-            <a:pPr lvl="1"/>
-            <a:endParaRPr lang="en-US" dirty="0" smtClean="0">
-              <a:solidFill>
-                <a:srgbClr val="0070C0"/>
-              </a:solidFill>
-            </a:endParaRPr>
-          </a:p>
-          <a:p>
-            <a:endParaRPr lang="en-US" dirty="0">
-              <a:solidFill>
-                <a:srgbClr val="0070C0"/>
-              </a:solidFill>
-            </a:endParaRPr>
-          </a:p>
-        </p:txBody>
-      </p:sp>
-    </p:spTree>
-    <p:extLst>
-      <p:ext uri="{BB962C8B-B14F-4D97-AF65-F5344CB8AC3E}">
-        <p14:creationId xmlns:p14="http://schemas.microsoft.com/office/powerpoint/2010/main" val="3602664512"/>
       </p:ext>
     </p:extLst>
   </p:cSld>
@@ -5262,7 +5205,7 @@
                   <a:srgbClr val="0070C0"/>
                 </a:solidFill>
               </a:rPr>
-              <a:t>Category 3:</a:t>
+              <a:t>Category 2:</a:t>
             </a:r>
           </a:p>
           <a:p>
@@ -5273,7 +5216,7 @@
                   <a:srgbClr val="0070C0"/>
                 </a:solidFill>
               </a:rPr>
-              <a:t>“billion”: 126 times</a:t>
+              <a:t>“oil”: 147 times</a:t>
             </a:r>
           </a:p>
           <a:p>
@@ -5292,15 +5235,15 @@
                   <a:srgbClr val="0070C0"/>
                 </a:solidFill>
               </a:rPr>
-              <a:t>ceo</a:t>
-            </a:r>
-            <a:r>
-              <a:rPr lang="en-US" dirty="0" smtClean="0">
-                <a:solidFill>
-                  <a:srgbClr val="0070C0"/>
-                </a:solidFill>
-              </a:rPr>
-              <a:t>”: 110</a:t>
+              <a:t>saudi</a:t>
+            </a:r>
+            <a:r>
+              <a:rPr lang="en-US" dirty="0" smtClean="0">
+                <a:solidFill>
+                  <a:srgbClr val="0070C0"/>
+                </a:solidFill>
+              </a:rPr>
+              <a:t>”: 42</a:t>
             </a:r>
           </a:p>
           <a:p>
@@ -5311,7 +5254,7 @@
                   <a:srgbClr val="0070C0"/>
                 </a:solidFill>
               </a:rPr>
-              <a:t>“sources”: 95</a:t>
+              <a:t>“crude”: 31</a:t>
             </a:r>
           </a:p>
           <a:p>
@@ -5322,7 +5265,23 @@
                   <a:srgbClr val="0070C0"/>
                 </a:solidFill>
               </a:rPr>
-              <a:t>Ex: “Nestle teams up with Canadian plant-based ingredients…”</a:t>
+              <a:t>“</a:t>
+            </a:r>
+            <a:r>
+              <a:rPr lang="en-US" dirty="0" err="1" smtClean="0">
+                <a:solidFill>
+                  <a:srgbClr val="0070C0"/>
+                </a:solidFill>
+              </a:rPr>
+              <a:t>opec</a:t>
+            </a:r>
+            <a:r>
+              <a:rPr lang="en-US" dirty="0" smtClean="0">
+                <a:solidFill>
+                  <a:srgbClr val="0070C0"/>
+                </a:solidFill>
+              </a:rPr>
+              <a:t>”: 25</a:t>
             </a:r>
           </a:p>
           <a:p>
@@ -5333,7 +5292,7 @@
                   <a:srgbClr val="0070C0"/>
                 </a:solidFill>
               </a:rPr>
-              <a:t>Ex: “Xerox nominates new HP board after buyout…”</a:t>
+              <a:t>Ex: “Oil slides 2% as glut forecast…”</a:t>
             </a:r>
           </a:p>
           <a:p>
@@ -5344,23 +5303,18 @@
                   <a:srgbClr val="0070C0"/>
                 </a:solidFill>
               </a:rPr>
-              <a:t>Ex: “JPMorgan board raises </a:t>
-            </a:r>
-            <a:r>
-              <a:rPr lang="en-US" smtClean="0">
-                <a:solidFill>
-                  <a:srgbClr val="0070C0"/>
-                </a:solidFill>
-              </a:rPr>
-              <a:t>CEO Dimon's </a:t>
-            </a:r>
-            <a:r>
-              <a:rPr lang="en-US" dirty="0" smtClean="0">
-                <a:solidFill>
-                  <a:srgbClr val="0070C0"/>
-                </a:solidFill>
-              </a:rPr>
-              <a:t>pay to….”</a:t>
+              <a:t>Ex: “Oil edges up after five days of losses…”</a:t>
+            </a:r>
+          </a:p>
+          <a:p>
+            <a:pPr lvl="1"/>
+            <a:r>
+              <a:rPr lang="en-US" dirty="0" smtClean="0">
+                <a:solidFill>
+                  <a:srgbClr val="0070C0"/>
+                </a:solidFill>
+              </a:rPr>
+              <a:t>Ex: “Divergent paths: Oil, natural gas going different…”</a:t>
             </a:r>
           </a:p>
           <a:p>
@@ -5372,14 +5326,6 @@
             </a:endParaRPr>
           </a:p>
           <a:p>
-            <a:pPr lvl="1"/>
-            <a:endParaRPr lang="en-US" dirty="0" smtClean="0">
-              <a:solidFill>
-                <a:srgbClr val="0070C0"/>
-              </a:solidFill>
-            </a:endParaRPr>
-          </a:p>
-          <a:p>
             <a:endParaRPr lang="en-US" dirty="0">
               <a:solidFill>
                 <a:srgbClr val="0070C0"/>
@@ -5391,7 +5337,7 @@
     </p:spTree>
     <p:extLst>
       <p:ext uri="{BB962C8B-B14F-4D97-AF65-F5344CB8AC3E}">
-        <p14:creationId xmlns:p14="http://schemas.microsoft.com/office/powerpoint/2010/main" val="1530036982"/>
+        <p14:creationId xmlns:p14="http://schemas.microsoft.com/office/powerpoint/2010/main" val="3602664512"/>
       </p:ext>
     </p:extLst>
   </p:cSld>
@@ -5498,6 +5444,242 @@
                   <a:srgbClr val="0070C0"/>
                 </a:solidFill>
               </a:rPr>
+              <a:t>Category 3:</a:t>
+            </a:r>
+          </a:p>
+          <a:p>
+            <a:pPr lvl="1"/>
+            <a:r>
+              <a:rPr lang="en-US" dirty="0" smtClean="0">
+                <a:solidFill>
+                  <a:srgbClr val="0070C0"/>
+                </a:solidFill>
+              </a:rPr>
+              <a:t>“billion”: 126 times</a:t>
+            </a:r>
+          </a:p>
+          <a:p>
+            <a:pPr lvl="1"/>
+            <a:r>
+              <a:rPr lang="en-US" dirty="0" smtClean="0">
+                <a:solidFill>
+                  <a:srgbClr val="0070C0"/>
+                </a:solidFill>
+              </a:rPr>
+              <a:t>“</a:t>
+            </a:r>
+            <a:r>
+              <a:rPr lang="en-US" dirty="0" err="1" smtClean="0">
+                <a:solidFill>
+                  <a:srgbClr val="0070C0"/>
+                </a:solidFill>
+              </a:rPr>
+              <a:t>ceo</a:t>
+            </a:r>
+            <a:r>
+              <a:rPr lang="en-US" dirty="0" smtClean="0">
+                <a:solidFill>
+                  <a:srgbClr val="0070C0"/>
+                </a:solidFill>
+              </a:rPr>
+              <a:t>”: 110</a:t>
+            </a:r>
+          </a:p>
+          <a:p>
+            <a:pPr lvl="1"/>
+            <a:r>
+              <a:rPr lang="en-US" dirty="0" smtClean="0">
+                <a:solidFill>
+                  <a:srgbClr val="0070C0"/>
+                </a:solidFill>
+              </a:rPr>
+              <a:t>“sources”: 95</a:t>
+            </a:r>
+          </a:p>
+          <a:p>
+            <a:pPr lvl="1"/>
+            <a:r>
+              <a:rPr lang="en-US" dirty="0" smtClean="0">
+                <a:solidFill>
+                  <a:srgbClr val="0070C0"/>
+                </a:solidFill>
+              </a:rPr>
+              <a:t>Ex: “Nestle teams up with Canadian plant-based ingredients…”</a:t>
+            </a:r>
+          </a:p>
+          <a:p>
+            <a:pPr lvl="1"/>
+            <a:r>
+              <a:rPr lang="en-US" dirty="0" smtClean="0">
+                <a:solidFill>
+                  <a:srgbClr val="0070C0"/>
+                </a:solidFill>
+              </a:rPr>
+              <a:t>Ex: “Xerox nominates new HP board after buyout…”</a:t>
+            </a:r>
+          </a:p>
+          <a:p>
+            <a:pPr lvl="1"/>
+            <a:r>
+              <a:rPr lang="en-US" dirty="0" smtClean="0">
+                <a:solidFill>
+                  <a:srgbClr val="0070C0"/>
+                </a:solidFill>
+              </a:rPr>
+              <a:t>Ex: “JPMorgan board raises </a:t>
+            </a:r>
+            <a:r>
+              <a:rPr lang="en-US" smtClean="0">
+                <a:solidFill>
+                  <a:srgbClr val="0070C0"/>
+                </a:solidFill>
+              </a:rPr>
+              <a:t>CEO Dimon's </a:t>
+            </a:r>
+            <a:r>
+              <a:rPr lang="en-US" dirty="0" smtClean="0">
+                <a:solidFill>
+                  <a:srgbClr val="0070C0"/>
+                </a:solidFill>
+              </a:rPr>
+              <a:t>pay to….”</a:t>
+            </a:r>
+          </a:p>
+          <a:p>
+            <a:pPr lvl="1"/>
+            <a:endParaRPr lang="en-US" dirty="0" smtClean="0">
+              <a:solidFill>
+                <a:srgbClr val="0070C0"/>
+              </a:solidFill>
+            </a:endParaRPr>
+          </a:p>
+          <a:p>
+            <a:pPr lvl="1"/>
+            <a:endParaRPr lang="en-US" dirty="0" smtClean="0">
+              <a:solidFill>
+                <a:srgbClr val="0070C0"/>
+              </a:solidFill>
+            </a:endParaRPr>
+          </a:p>
+          <a:p>
+            <a:endParaRPr lang="en-US" dirty="0">
+              <a:solidFill>
+                <a:srgbClr val="0070C0"/>
+              </a:solidFill>
+            </a:endParaRPr>
+          </a:p>
+        </p:txBody>
+      </p:sp>
+    </p:spTree>
+    <p:extLst>
+      <p:ext uri="{BB962C8B-B14F-4D97-AF65-F5344CB8AC3E}">
+        <p14:creationId xmlns:p14="http://schemas.microsoft.com/office/powerpoint/2010/main" val="1530036982"/>
+      </p:ext>
+    </p:extLst>
+  </p:cSld>
+  <p:clrMapOvr>
+    <a:masterClrMapping/>
+  </p:clrMapOvr>
+  <p:timing>
+    <p:tnLst>
+      <p:par>
+        <p:cTn id="1" dur="indefinite" restart="never" nodeType="tmRoot"/>
+      </p:par>
+    </p:tnLst>
+  </p:timing>
+</p:sld>
+</file>
+
+<file path=ppt/slides/slide19.xml><?xml version="1.0" encoding="utf-8"?>
+<p:sld xmlns:a="http://schemas.openxmlformats.org/drawingml/2006/main" xmlns:r="http://schemas.openxmlformats.org/officeDocument/2006/relationships" xmlns:p="http://schemas.openxmlformats.org/presentationml/2006/main">
+  <p:cSld>
+    <p:bg>
+      <p:bgPr>
+        <a:blipFill dpi="0" rotWithShape="1">
+          <a:blip r:embed="rId2">
+            <a:lum/>
+          </a:blip>
+          <a:srcRect/>
+          <a:stretch>
+            <a:fillRect l="-7000" r="-7000"/>
+          </a:stretch>
+        </a:blipFill>
+        <a:effectLst/>
+      </p:bgPr>
+    </p:bg>
+    <p:spTree>
+      <p:nvGrpSpPr>
+        <p:cNvPr id="1" name=""/>
+        <p:cNvGrpSpPr/>
+        <p:nvPr/>
+      </p:nvGrpSpPr>
+      <p:grpSpPr>
+        <a:xfrm>
+          <a:off x="0" y="0"/>
+          <a:ext cx="0" cy="0"/>
+          <a:chOff x="0" y="0"/>
+          <a:chExt cx="0" cy="0"/>
+        </a:xfrm>
+      </p:grpSpPr>
+      <p:sp>
+        <p:nvSpPr>
+          <p:cNvPr id="2" name="Title 1"/>
+          <p:cNvSpPr>
+            <a:spLocks noGrp="1"/>
+          </p:cNvSpPr>
+          <p:nvPr>
+            <p:ph type="title"/>
+          </p:nvPr>
+        </p:nvSpPr>
+        <p:spPr/>
+        <p:txBody>
+          <a:bodyPr/>
+          <a:lstStyle/>
+          <a:p>
+            <a:r>
+              <a:rPr lang="en-US" dirty="0" smtClean="0">
+                <a:solidFill>
+                  <a:srgbClr val="0070C0"/>
+                </a:solidFill>
+              </a:rPr>
+              <a:t>Tell K-Means to find 10 categories</a:t>
+            </a:r>
+            <a:endParaRPr lang="en-US" dirty="0">
+              <a:solidFill>
+                <a:srgbClr val="0070C0"/>
+              </a:solidFill>
+            </a:endParaRPr>
+          </a:p>
+        </p:txBody>
+      </p:sp>
+      <p:sp>
+        <p:nvSpPr>
+          <p:cNvPr id="3" name="Content Placeholder 2"/>
+          <p:cNvSpPr>
+            <a:spLocks noGrp="1"/>
+          </p:cNvSpPr>
+          <p:nvPr>
+            <p:ph idx="1"/>
+          </p:nvPr>
+        </p:nvSpPr>
+        <p:spPr>
+          <a:xfrm>
+            <a:off x="457200" y="1600200"/>
+            <a:ext cx="8229600" cy="4876800"/>
+          </a:xfrm>
+        </p:spPr>
+        <p:txBody>
+          <a:bodyPr>
+            <a:normAutofit/>
+          </a:bodyPr>
+          <a:lstStyle/>
+          <a:p>
+            <a:r>
+              <a:rPr lang="en-US" dirty="0" smtClean="0">
+                <a:solidFill>
+                  <a:srgbClr val="0070C0"/>
+                </a:solidFill>
+              </a:rPr>
               <a:t>Category 4:</a:t>
             </a:r>
           </a:p>
@@ -5623,7 +5805,195 @@
 </p:sld>
 </file>
 
-<file path=ppt/slides/slide19.xml><?xml version="1.0" encoding="utf-8"?>
+<file path=ppt/slides/slide2.xml><?xml version="1.0" encoding="utf-8"?>
+<p:sld xmlns:a="http://schemas.openxmlformats.org/drawingml/2006/main" xmlns:r="http://schemas.openxmlformats.org/officeDocument/2006/relationships" xmlns:p="http://schemas.openxmlformats.org/presentationml/2006/main">
+  <p:cSld>
+    <p:bg>
+      <p:bgPr>
+        <a:blipFill dpi="0" rotWithShape="1">
+          <a:blip r:embed="rId2">
+            <a:lum/>
+          </a:blip>
+          <a:srcRect/>
+          <a:stretch>
+            <a:fillRect l="-7000" r="-7000"/>
+          </a:stretch>
+        </a:blipFill>
+        <a:effectLst/>
+      </p:bgPr>
+    </p:bg>
+    <p:spTree>
+      <p:nvGrpSpPr>
+        <p:cNvPr id="1" name=""/>
+        <p:cNvGrpSpPr/>
+        <p:nvPr/>
+      </p:nvGrpSpPr>
+      <p:grpSpPr>
+        <a:xfrm>
+          <a:off x="0" y="0"/>
+          <a:ext cx="0" cy="0"/>
+          <a:chOff x="0" y="0"/>
+          <a:chExt cx="0" cy="0"/>
+        </a:xfrm>
+      </p:grpSpPr>
+      <p:sp>
+        <p:nvSpPr>
+          <p:cNvPr id="4" name="Title 3"/>
+          <p:cNvSpPr>
+            <a:spLocks noGrp="1"/>
+          </p:cNvSpPr>
+          <p:nvPr>
+            <p:ph type="title"/>
+          </p:nvPr>
+        </p:nvSpPr>
+        <p:spPr>
+          <a:xfrm>
+            <a:off x="457200" y="1066800"/>
+            <a:ext cx="8229600" cy="762000"/>
+          </a:xfrm>
+        </p:spPr>
+        <p:txBody>
+          <a:bodyPr/>
+          <a:lstStyle/>
+          <a:p>
+            <a:r>
+              <a:rPr lang="en-US" dirty="0" smtClean="0">
+                <a:solidFill>
+                  <a:srgbClr val="0070C0"/>
+                </a:solidFill>
+              </a:rPr>
+              <a:t>Areas to examine:</a:t>
+            </a:r>
+            <a:endParaRPr lang="en-US" dirty="0">
+              <a:solidFill>
+                <a:srgbClr val="0070C0"/>
+              </a:solidFill>
+            </a:endParaRPr>
+          </a:p>
+        </p:txBody>
+      </p:sp>
+      <p:sp>
+        <p:nvSpPr>
+          <p:cNvPr id="5" name="Content Placeholder 4"/>
+          <p:cNvSpPr>
+            <a:spLocks noGrp="1"/>
+          </p:cNvSpPr>
+          <p:nvPr>
+            <p:ph idx="1"/>
+          </p:nvPr>
+        </p:nvSpPr>
+        <p:spPr>
+          <a:xfrm>
+            <a:off x="457200" y="2133600"/>
+            <a:ext cx="8229600" cy="3657600"/>
+          </a:xfrm>
+        </p:spPr>
+        <p:txBody>
+          <a:bodyPr/>
+          <a:lstStyle/>
+          <a:p>
+            <a:pPr marL="514350" indent="-514350">
+              <a:buFont typeface="+mj-lt"/>
+              <a:buAutoNum type="arabicPeriod"/>
+            </a:pPr>
+            <a:r>
+              <a:rPr lang="en-US" dirty="0" smtClean="0">
+                <a:solidFill>
+                  <a:srgbClr val="0070C0"/>
+                </a:solidFill>
+              </a:rPr>
+              <a:t>Which topics have been hot?</a:t>
+            </a:r>
+          </a:p>
+          <a:p>
+            <a:pPr marL="914400" lvl="1" indent="-514350"/>
+            <a:r>
+              <a:rPr lang="en-US" dirty="0" smtClean="0">
+                <a:solidFill>
+                  <a:srgbClr val="0070C0"/>
+                </a:solidFill>
+              </a:rPr>
+              <a:t>Application for reporters and article writers</a:t>
+            </a:r>
+          </a:p>
+          <a:p>
+            <a:pPr marL="514350" indent="-514350">
+              <a:buFont typeface="+mj-lt"/>
+              <a:buAutoNum type="arabicPeriod"/>
+            </a:pPr>
+            <a:r>
+              <a:rPr lang="en-US" dirty="0" smtClean="0">
+                <a:solidFill>
+                  <a:srgbClr val="0070C0"/>
+                </a:solidFill>
+              </a:rPr>
+              <a:t>Can we classify articles better?</a:t>
+            </a:r>
+          </a:p>
+          <a:p>
+            <a:pPr marL="914400" lvl="1" indent="-514350"/>
+            <a:r>
+              <a:rPr lang="en-US" dirty="0" smtClean="0">
+                <a:solidFill>
+                  <a:srgbClr val="0070C0"/>
+                </a:solidFill>
+              </a:rPr>
+              <a:t>Application for recommending articles</a:t>
+            </a:r>
+          </a:p>
+          <a:p>
+            <a:pPr marL="514350" indent="-514350">
+              <a:buFont typeface="+mj-lt"/>
+              <a:buAutoNum type="arabicPeriod"/>
+            </a:pPr>
+            <a:r>
+              <a:rPr lang="en-US" dirty="0" smtClean="0">
+                <a:solidFill>
+                  <a:srgbClr val="0070C0"/>
+                </a:solidFill>
+              </a:rPr>
+              <a:t>Can we measure the sentiment of articles?</a:t>
+            </a:r>
+          </a:p>
+          <a:p>
+            <a:pPr marL="914400" lvl="1" indent="-514350"/>
+            <a:r>
+              <a:rPr lang="en-US" dirty="0" smtClean="0">
+                <a:solidFill>
+                  <a:srgbClr val="0070C0"/>
+                </a:solidFill>
+              </a:rPr>
+              <a:t>Application for NLP and for finance</a:t>
+            </a:r>
+            <a:endParaRPr lang="en-US" dirty="0">
+              <a:solidFill>
+                <a:srgbClr val="0070C0"/>
+              </a:solidFill>
+            </a:endParaRPr>
+          </a:p>
+        </p:txBody>
+      </p:sp>
+    </p:spTree>
+    <p:extLst>
+      <p:ext uri="{BB962C8B-B14F-4D97-AF65-F5344CB8AC3E}">
+        <p14:creationId xmlns:p14="http://schemas.microsoft.com/office/powerpoint/2010/main" val="1805968033"/>
+      </p:ext>
+    </p:extLst>
+  </p:cSld>
+  <p:clrMapOvr>
+    <a:masterClrMapping/>
+  </p:clrMapOvr>
+  <p:timing>
+    <p:tnLst>
+      <p:par>
+        <p:cTn id="1" dur="indefinite" restart="never" nodeType="tmRoot"/>
+      </p:par>
+    </p:tnLst>
+  </p:timing>
+</p:sld>
+</file>
+
+<file path=ppt/slides/slide20.xml><?xml version="1.0" encoding="utf-8"?>
 <p:sld xmlns:a="http://schemas.openxmlformats.org/drawingml/2006/main" xmlns:r="http://schemas.openxmlformats.org/officeDocument/2006/relationships" xmlns:p="http://schemas.openxmlformats.org/presentationml/2006/main">
   <p:cSld>
     <p:spTree>
@@ -5795,288 +6165,6 @@
     <p:extLst>
       <p:ext uri="{BB962C8B-B14F-4D97-AF65-F5344CB8AC3E}">
         <p14:creationId xmlns:p14="http://schemas.microsoft.com/office/powerpoint/2010/main" val="2132183310"/>
-      </p:ext>
-    </p:extLst>
-  </p:cSld>
-  <p:clrMapOvr>
-    <a:masterClrMapping/>
-  </p:clrMapOvr>
-  <p:timing>
-    <p:tnLst>
-      <p:par>
-        <p:cTn id="1" dur="indefinite" restart="never" nodeType="tmRoot"/>
-      </p:par>
-    </p:tnLst>
-  </p:timing>
-</p:sld>
-</file>
-
-<file path=ppt/slides/slide2.xml><?xml version="1.0" encoding="utf-8"?>
-<p:sld xmlns:a="http://schemas.openxmlformats.org/drawingml/2006/main" xmlns:r="http://schemas.openxmlformats.org/officeDocument/2006/relationships" xmlns:p="http://schemas.openxmlformats.org/presentationml/2006/main">
-  <p:cSld>
-    <p:spTree>
-      <p:nvGrpSpPr>
-        <p:cNvPr id="1" name=""/>
-        <p:cNvGrpSpPr/>
-        <p:nvPr/>
-      </p:nvGrpSpPr>
-      <p:grpSpPr>
-        <a:xfrm>
-          <a:off x="0" y="0"/>
-          <a:ext cx="0" cy="0"/>
-          <a:chOff x="0" y="0"/>
-          <a:chExt cx="0" cy="0"/>
-        </a:xfrm>
-      </p:grpSpPr>
-      <p:sp>
-        <p:nvSpPr>
-          <p:cNvPr id="2" name="Title 1"/>
-          <p:cNvSpPr>
-            <a:spLocks noGrp="1"/>
-          </p:cNvSpPr>
-          <p:nvPr>
-            <p:ph type="title"/>
-          </p:nvPr>
-        </p:nvSpPr>
-        <p:spPr/>
-        <p:txBody>
-          <a:bodyPr/>
-          <a:lstStyle/>
-          <a:p>
-            <a:endParaRPr lang="en-US" dirty="0"/>
-          </a:p>
-        </p:txBody>
-      </p:sp>
-      <p:sp>
-        <p:nvSpPr>
-          <p:cNvPr id="3" name="Content Placeholder 2"/>
-          <p:cNvSpPr>
-            <a:spLocks noGrp="1"/>
-          </p:cNvSpPr>
-          <p:nvPr>
-            <p:ph idx="1"/>
-          </p:nvPr>
-        </p:nvSpPr>
-        <p:spPr/>
-        <p:txBody>
-          <a:bodyPr/>
-          <a:lstStyle/>
-          <a:p>
-            <a:endParaRPr lang="en-US" dirty="0"/>
-          </a:p>
-        </p:txBody>
-      </p:sp>
-      <p:pic>
-        <p:nvPicPr>
-          <p:cNvPr id="2050" name="Picture 2"/>
-          <p:cNvPicPr>
-            <a:picLocks noChangeAspect="1" noChangeArrowheads="1"/>
-          </p:cNvPicPr>
-          <p:nvPr/>
-        </p:nvPicPr>
-        <p:blipFill>
-          <a:blip r:embed="rId2">
-            <a:extLst>
-              <a:ext uri="{28A0092B-C50C-407E-A947-70E740481C1C}">
-                <a14:useLocalDpi xmlns:a14="http://schemas.microsoft.com/office/drawing/2010/main" val="0"/>
-              </a:ext>
-            </a:extLst>
-          </a:blip>
-          <a:srcRect/>
-          <a:stretch>
-            <a:fillRect/>
-          </a:stretch>
-        </p:blipFill>
-        <p:spPr bwMode="auto">
-          <a:xfrm>
-            <a:off x="-37564" y="0"/>
-            <a:ext cx="10301653" cy="6858000"/>
-          </a:xfrm>
-          <a:prstGeom prst="rect">
-            <a:avLst/>
-          </a:prstGeom>
-          <a:noFill/>
-          <a:ln>
-            <a:noFill/>
-          </a:ln>
-          <a:effectLst/>
-          <a:extLst>
-            <a:ext uri="{909E8E84-426E-40DD-AFC4-6F175D3DCCD1}">
-              <a14:hiddenFill xmlns:a14="http://schemas.microsoft.com/office/drawing/2010/main">
-                <a:solidFill>
-                  <a:schemeClr val="accent1"/>
-                </a:solidFill>
-              </a14:hiddenFill>
-            </a:ext>
-            <a:ext uri="{91240B29-F687-4F45-9708-019B960494DF}">
-              <a14:hiddenLine xmlns:a14="http://schemas.microsoft.com/office/drawing/2010/main" w="9525">
-                <a:solidFill>
-                  <a:schemeClr val="tx1"/>
-                </a:solidFill>
-                <a:miter lim="800000"/>
-                <a:headEnd/>
-                <a:tailEnd/>
-              </a14:hiddenLine>
-            </a:ext>
-            <a:ext uri="{AF507438-7753-43E0-B8FC-AC1667EBCBE1}">
-              <a14:hiddenEffects xmlns:a14="http://schemas.microsoft.com/office/drawing/2010/main">
-                <a:effectLst>
-                  <a:outerShdw dist="35921" dir="2700000" algn="ctr" rotWithShape="0">
-                    <a:schemeClr val="bg2"/>
-                  </a:outerShdw>
-                </a:effectLst>
-              </a14:hiddenEffects>
-            </a:ext>
-          </a:extLst>
-        </p:spPr>
-      </p:pic>
-    </p:spTree>
-    <p:extLst>
-      <p:ext uri="{BB962C8B-B14F-4D97-AF65-F5344CB8AC3E}">
-        <p14:creationId xmlns:p14="http://schemas.microsoft.com/office/powerpoint/2010/main" val="4006753724"/>
-      </p:ext>
-    </p:extLst>
-  </p:cSld>
-  <p:clrMapOvr>
-    <a:masterClrMapping/>
-  </p:clrMapOvr>
-  <p:timing>
-    <p:tnLst>
-      <p:par>
-        <p:cTn id="1" dur="indefinite" restart="never" nodeType="tmRoot"/>
-      </p:par>
-    </p:tnLst>
-  </p:timing>
-</p:sld>
-</file>
-
-<file path=ppt/slides/slide20.xml><?xml version="1.0" encoding="utf-8"?>
-<p:sld xmlns:a="http://schemas.openxmlformats.org/drawingml/2006/main" xmlns:r="http://schemas.openxmlformats.org/officeDocument/2006/relationships" xmlns:p="http://schemas.openxmlformats.org/presentationml/2006/main">
-  <p:cSld>
-    <p:bg>
-      <p:bgPr>
-        <a:blipFill dpi="0" rotWithShape="1">
-          <a:blip r:embed="rId2">
-            <a:lum/>
-          </a:blip>
-          <a:srcRect/>
-          <a:stretch>
-            <a:fillRect l="-7000" r="-7000"/>
-          </a:stretch>
-        </a:blipFill>
-        <a:effectLst/>
-      </p:bgPr>
-    </p:bg>
-    <p:spTree>
-      <p:nvGrpSpPr>
-        <p:cNvPr id="1" name=""/>
-        <p:cNvGrpSpPr/>
-        <p:nvPr/>
-      </p:nvGrpSpPr>
-      <p:grpSpPr>
-        <a:xfrm>
-          <a:off x="0" y="0"/>
-          <a:ext cx="0" cy="0"/>
-          <a:chOff x="0" y="0"/>
-          <a:chExt cx="0" cy="0"/>
-        </a:xfrm>
-      </p:grpSpPr>
-      <p:sp>
-        <p:nvSpPr>
-          <p:cNvPr id="2" name="Title 1"/>
-          <p:cNvSpPr>
-            <a:spLocks noGrp="1"/>
-          </p:cNvSpPr>
-          <p:nvPr>
-            <p:ph type="title"/>
-          </p:nvPr>
-        </p:nvSpPr>
-        <p:spPr/>
-        <p:txBody>
-          <a:bodyPr/>
-          <a:lstStyle/>
-          <a:p>
-            <a:r>
-              <a:rPr lang="en-US" dirty="0" smtClean="0">
-                <a:solidFill>
-                  <a:srgbClr val="0070C0"/>
-                </a:solidFill>
-              </a:rPr>
-              <a:t>K-Means Algorithm: Discussion</a:t>
-            </a:r>
-            <a:endParaRPr lang="en-US" dirty="0">
-              <a:solidFill>
-                <a:srgbClr val="0070C0"/>
-              </a:solidFill>
-            </a:endParaRPr>
-          </a:p>
-        </p:txBody>
-      </p:sp>
-      <p:sp>
-        <p:nvSpPr>
-          <p:cNvPr id="3" name="Content Placeholder 2"/>
-          <p:cNvSpPr>
-            <a:spLocks noGrp="1"/>
-          </p:cNvSpPr>
-          <p:nvPr>
-            <p:ph idx="1"/>
-          </p:nvPr>
-        </p:nvSpPr>
-        <p:spPr/>
-        <p:txBody>
-          <a:bodyPr/>
-          <a:lstStyle/>
-          <a:p>
-            <a:r>
-              <a:rPr lang="en-US" dirty="0" smtClean="0">
-                <a:solidFill>
-                  <a:srgbClr val="0070C0"/>
-                </a:solidFill>
-              </a:rPr>
-              <a:t>There were ~6,500 observations / news articles (n = 6,500)</a:t>
-            </a:r>
-          </a:p>
-          <a:p>
-            <a:r>
-              <a:rPr lang="en-US" dirty="0" smtClean="0">
-                <a:solidFill>
-                  <a:srgbClr val="0070C0"/>
-                </a:solidFill>
-              </a:rPr>
-              <a:t>I used the 250 most common words as my 250 features (m = 250)</a:t>
-            </a:r>
-          </a:p>
-          <a:p>
-            <a:r>
-              <a:rPr lang="en-US" dirty="0" smtClean="0">
-                <a:solidFill>
-                  <a:srgbClr val="0070C0"/>
-                </a:solidFill>
-              </a:rPr>
-              <a:t>Consideration 1: Choosing the number of clusters (value of k)</a:t>
-            </a:r>
-          </a:p>
-          <a:p>
-            <a:r>
-              <a:rPr lang="en-US" dirty="0" smtClean="0">
-                <a:solidFill>
-                  <a:srgbClr val="0070C0"/>
-                </a:solidFill>
-              </a:rPr>
-              <a:t>Consideration 2: Random initialization to avoid getting stuck at local optima</a:t>
-            </a:r>
-            <a:endParaRPr lang="en-US" dirty="0">
-              <a:solidFill>
-                <a:srgbClr val="0070C0"/>
-              </a:solidFill>
-            </a:endParaRPr>
-          </a:p>
-        </p:txBody>
-      </p:sp>
-    </p:spTree>
-    <p:extLst>
-      <p:ext uri="{BB962C8B-B14F-4D97-AF65-F5344CB8AC3E}">
-        <p14:creationId xmlns:p14="http://schemas.microsoft.com/office/powerpoint/2010/main" val="3163551472"/>
       </p:ext>
     </p:extLst>
   </p:cSld>
@@ -6145,7 +6233,7 @@
                   <a:srgbClr val="0070C0"/>
                 </a:solidFill>
               </a:rPr>
-              <a:t>Sentiment Analysis</a:t>
+              <a:t>K-Means Algorithm: Discussion</a:t>
             </a:r>
             <a:endParaRPr lang="en-US" dirty="0">
               <a:solidFill>
@@ -6165,16 +6253,9 @@
             <p:ph idx="1"/>
           </p:nvPr>
         </p:nvSpPr>
-        <p:spPr>
-          <a:xfrm>
-            <a:off x="457200" y="1828800"/>
-            <a:ext cx="8229600" cy="4525963"/>
-          </a:xfrm>
-        </p:spPr>
-        <p:txBody>
-          <a:bodyPr>
-            <a:normAutofit/>
-          </a:bodyPr>
+        <p:spPr/>
+        <p:txBody>
+          <a:bodyPr/>
           <a:lstStyle/>
           <a:p>
             <a:r>
@@ -6183,72 +6264,37 @@
                   <a:srgbClr val="0070C0"/>
                 </a:solidFill>
               </a:rPr>
-              <a:t>“NLTK” library can tokenize, show parse trees, evaluate sentiment, and more…</a:t>
-            </a:r>
-          </a:p>
-          <a:p>
-            <a:endParaRPr lang="en-US" dirty="0" smtClean="0">
-              <a:solidFill>
-                <a:srgbClr val="0070C0"/>
-              </a:solidFill>
-            </a:endParaRPr>
-          </a:p>
-          <a:p>
-            <a:pPr marL="400050" lvl="1" indent="0">
-              <a:buNone/>
-            </a:pPr>
-            <a:r>
-              <a:rPr lang="en-US" dirty="0" smtClean="0">
-                <a:solidFill>
-                  <a:srgbClr val="0070C0"/>
-                </a:solidFill>
-              </a:rPr>
-              <a:t>“SEATTLE (Reuters) - Boeing Co (,) on Saturday successfully completed the maiden flight of </a:t>
-            </a:r>
-            <a:r>
-              <a:rPr lang="en-US" smtClean="0">
-                <a:solidFill>
-                  <a:srgbClr val="0070C0"/>
-                </a:solidFill>
-              </a:rPr>
-              <a:t>the world's </a:t>
-            </a:r>
-            <a:r>
-              <a:rPr lang="en-US" dirty="0" smtClean="0">
-                <a:solidFill>
-                  <a:srgbClr val="0070C0"/>
-                </a:solidFill>
-              </a:rPr>
-              <a:t>largest twin-</a:t>
-            </a:r>
-            <a:r>
-              <a:rPr lang="en-US" dirty="0" err="1" smtClean="0">
-                <a:solidFill>
-                  <a:srgbClr val="0070C0"/>
-                </a:solidFill>
-              </a:rPr>
-              <a:t>engined</a:t>
-            </a:r>
-            <a:r>
-              <a:rPr lang="en-US" dirty="0" smtClean="0">
-                <a:solidFill>
-                  <a:srgbClr val="0070C0"/>
-                </a:solidFill>
-              </a:rPr>
-              <a:t> jetliner, the 777X. ,The 252-foot-long passenger jet landed at Boeing Field near downtown Seattle at 2:00 p.m. local time”</a:t>
-            </a:r>
-          </a:p>
-          <a:p>
-            <a:pPr marL="400050" lvl="1" indent="0">
-              <a:buNone/>
-            </a:pPr>
-            <a:r>
-              <a:rPr lang="en-US" dirty="0" smtClean="0">
-                <a:solidFill>
-                  <a:srgbClr val="0070C0"/>
-                </a:solidFill>
-              </a:rPr>
-              <a:t>Sentiment is:  0.34</a:t>
+              <a:t>There were ~6,500 observations / news articles (n = 6,500)</a:t>
+            </a:r>
+          </a:p>
+          <a:p>
+            <a:r>
+              <a:rPr lang="en-US" dirty="0" smtClean="0">
+                <a:solidFill>
+                  <a:srgbClr val="0070C0"/>
+                </a:solidFill>
+              </a:rPr>
+              <a:t>I used the 250 most common words as my 250 features (m = 250)</a:t>
+            </a:r>
+          </a:p>
+          <a:p>
+            <a:r>
+              <a:rPr lang="en-US" dirty="0" smtClean="0">
+                <a:solidFill>
+                  <a:srgbClr val="0070C0"/>
+                </a:solidFill>
+              </a:rPr>
+              <a:t>Consideration 1: Choosing the number of clusters (value of k)</a:t>
+            </a:r>
+          </a:p>
+          <a:p>
+            <a:r>
+              <a:rPr lang="en-US" dirty="0" smtClean="0">
+                <a:solidFill>
+                  <a:srgbClr val="0070C0"/>
+                </a:solidFill>
+              </a:rPr>
+              <a:t>Consideration 2: Random initialization to avoid getting stuck at local optima</a:t>
             </a:r>
             <a:endParaRPr lang="en-US" dirty="0">
               <a:solidFill>
@@ -6261,7 +6307,7 @@
     </p:spTree>
     <p:extLst>
       <p:ext uri="{BB962C8B-B14F-4D97-AF65-F5344CB8AC3E}">
-        <p14:creationId xmlns:p14="http://schemas.microsoft.com/office/powerpoint/2010/main" val="216303887"/>
+        <p14:creationId xmlns:p14="http://schemas.microsoft.com/office/powerpoint/2010/main" val="3163551472"/>
       </p:ext>
     </p:extLst>
   </p:cSld>
@@ -6330,7 +6376,7 @@
                   <a:srgbClr val="0070C0"/>
                 </a:solidFill>
               </a:rPr>
-              <a:t>Sentiment Analysis - Finance</a:t>
+              <a:t>Sentiment Analysis</a:t>
             </a:r>
             <a:endParaRPr lang="en-US" dirty="0">
               <a:solidFill>
@@ -6350,9 +6396,16 @@
             <p:ph idx="1"/>
           </p:nvPr>
         </p:nvSpPr>
-        <p:spPr/>
-        <p:txBody>
-          <a:bodyPr/>
+        <p:spPr>
+          <a:xfrm>
+            <a:off x="457200" y="1828800"/>
+            <a:ext cx="8229600" cy="4525963"/>
+          </a:xfrm>
+        </p:spPr>
+        <p:txBody>
+          <a:bodyPr>
+            <a:normAutofit/>
+          </a:bodyPr>
           <a:lstStyle/>
           <a:p>
             <a:r>
@@ -6361,7 +6414,27 @@
                   <a:srgbClr val="0070C0"/>
                 </a:solidFill>
               </a:rPr>
-              <a:t>Sep 17 2019 has the lowest sentiment</a:t>
+              <a:t>“NLTK” library can tokenize, show parse trees, evaluate sentiment, and more…</a:t>
+            </a:r>
+          </a:p>
+          <a:p>
+            <a:endParaRPr lang="en-US" dirty="0" smtClean="0">
+              <a:solidFill>
+                <a:srgbClr val="0070C0"/>
+              </a:solidFill>
+            </a:endParaRPr>
+          </a:p>
+          <a:p>
+            <a:pPr marL="400050" lvl="1" indent="0">
+              <a:buNone/>
+            </a:pPr>
+            <a:r>
+              <a:rPr lang="en-US" dirty="0" smtClean="0">
+                <a:solidFill>
+                  <a:srgbClr val="0070C0"/>
+                </a:solidFill>
+              </a:rPr>
+              <a:t>“SEATTLE (Reuters) - Boeing Co (,) on Saturday successfully completed the maiden flight of </a:t>
             </a:r>
             <a:r>
               <a:rPr lang="en-US" smtClean="0">
@@ -6369,36 +6442,57 @@
                   <a:srgbClr val="0070C0"/>
                 </a:solidFill>
               </a:rPr>
-              <a:t>.  China's </a:t>
-            </a:r>
-            <a:r>
-              <a:rPr lang="en-US" dirty="0" smtClean="0">
-                <a:solidFill>
-                  <a:srgbClr val="0070C0"/>
-                </a:solidFill>
-              </a:rPr>
-              <a:t>industrial production declined to 17.5 year low and oil market was still recovering from drone attack on Saudi facilities.  The S&amp;P500 dropped 0.3% to close at 2,998</a:t>
-            </a:r>
-          </a:p>
-          <a:p>
-            <a:r>
-              <a:rPr lang="en-US" dirty="0" smtClean="0">
-                <a:solidFill>
-                  <a:srgbClr val="0070C0"/>
-                </a:solidFill>
-              </a:rPr>
-              <a:t>July 28 2019 (Sunday) had the highest sentiment.  When stocks opened on July 29 2019, S&amp;P500 rose 0.04%</a:t>
-            </a:r>
-          </a:p>
-          <a:p>
-            <a:endParaRPr lang="en-US" dirty="0"/>
+              <a:t>the world's </a:t>
+            </a:r>
+            <a:r>
+              <a:rPr lang="en-US" dirty="0" smtClean="0">
+                <a:solidFill>
+                  <a:srgbClr val="0070C0"/>
+                </a:solidFill>
+              </a:rPr>
+              <a:t>largest twin-</a:t>
+            </a:r>
+            <a:r>
+              <a:rPr lang="en-US" dirty="0" err="1" smtClean="0">
+                <a:solidFill>
+                  <a:srgbClr val="0070C0"/>
+                </a:solidFill>
+              </a:rPr>
+              <a:t>engined</a:t>
+            </a:r>
+            <a:r>
+              <a:rPr lang="en-US" dirty="0" smtClean="0">
+                <a:solidFill>
+                  <a:srgbClr val="0070C0"/>
+                </a:solidFill>
+              </a:rPr>
+              <a:t> jetliner, the 777X. ,The 252-foot-long passenger jet landed at Boeing Field near downtown Seattle at 2:00 p.m. local time”</a:t>
+            </a:r>
+          </a:p>
+          <a:p>
+            <a:pPr marL="400050" lvl="1" indent="0">
+              <a:buNone/>
+            </a:pPr>
+            <a:r>
+              <a:rPr lang="en-US" dirty="0" smtClean="0">
+                <a:solidFill>
+                  <a:srgbClr val="0070C0"/>
+                </a:solidFill>
+              </a:rPr>
+              <a:t>Sentiment is:  0.34</a:t>
+            </a:r>
+            <a:endParaRPr lang="en-US" dirty="0">
+              <a:solidFill>
+                <a:srgbClr val="0070C0"/>
+              </a:solidFill>
+            </a:endParaRPr>
           </a:p>
         </p:txBody>
       </p:sp>
     </p:spTree>
     <p:extLst>
       <p:ext uri="{BB962C8B-B14F-4D97-AF65-F5344CB8AC3E}">
-        <p14:creationId xmlns:p14="http://schemas.microsoft.com/office/powerpoint/2010/main" val="3474994011"/>
+        <p14:creationId xmlns:p14="http://schemas.microsoft.com/office/powerpoint/2010/main" val="216303887"/>
       </p:ext>
     </p:extLst>
   </p:cSld>
@@ -6498,70 +6592,34 @@
                   <a:srgbClr val="0070C0"/>
                 </a:solidFill>
               </a:rPr>
-              <a:t>Evidence that news sentiment impacts stocks is weak.  Monetizing is even harder</a:t>
-            </a:r>
-          </a:p>
-          <a:p>
-            <a:r>
-              <a:rPr lang="en-US" dirty="0" smtClean="0">
-                <a:solidFill>
-                  <a:srgbClr val="0070C0"/>
-                </a:solidFill>
-              </a:rPr>
-              <a:t>Possible reasons:</a:t>
-            </a:r>
-          </a:p>
-          <a:p>
-            <a:pPr lvl="1"/>
-            <a:r>
-              <a:rPr lang="en-US" dirty="0" smtClean="0">
-                <a:solidFill>
-                  <a:srgbClr val="0070C0"/>
-                </a:solidFill>
-              </a:rPr>
-              <a:t>“NLTK” is not trained for financial news sentiment</a:t>
-            </a:r>
-          </a:p>
-          <a:p>
-            <a:pPr lvl="1"/>
-            <a:r>
-              <a:rPr lang="en-US" dirty="0" smtClean="0">
-                <a:solidFill>
-                  <a:srgbClr val="0070C0"/>
-                </a:solidFill>
-              </a:rPr>
-              <a:t>Retail investors face many hurdles while trading</a:t>
-            </a:r>
-          </a:p>
-          <a:p>
-            <a:pPr lvl="1"/>
-            <a:r>
-              <a:rPr lang="en-US" dirty="0" smtClean="0">
-                <a:solidFill>
-                  <a:srgbClr val="0070C0"/>
-                </a:solidFill>
-              </a:rPr>
-              <a:t>The financial markets are already very efficient</a:t>
-            </a:r>
-          </a:p>
-          <a:p>
-            <a:pPr lvl="1"/>
-            <a:r>
-              <a:rPr lang="en-US" dirty="0" smtClean="0">
-                <a:solidFill>
-                  <a:srgbClr val="0070C0"/>
-                </a:solidFill>
-              </a:rPr>
-              <a:t>Stocks react to where reality materializes relative to prior expectations</a:t>
-            </a:r>
-          </a:p>
-          <a:p>
-            <a:pPr lvl="1"/>
-            <a:endParaRPr lang="en-US" dirty="0" smtClean="0">
-              <a:solidFill>
-                <a:srgbClr val="0070C0"/>
-              </a:solidFill>
-            </a:endParaRPr>
+              <a:t>Sep 17 2019 has the lowest sentiment</a:t>
+            </a:r>
+            <a:r>
+              <a:rPr lang="en-US" smtClean="0">
+                <a:solidFill>
+                  <a:srgbClr val="0070C0"/>
+                </a:solidFill>
+              </a:rPr>
+              <a:t>.  China's </a:t>
+            </a:r>
+            <a:r>
+              <a:rPr lang="en-US" dirty="0" smtClean="0">
+                <a:solidFill>
+                  <a:srgbClr val="0070C0"/>
+                </a:solidFill>
+              </a:rPr>
+              <a:t>industrial production declined to 17.5 year low and oil market was still recovering from drone attack on Saudi facilities.  The S&amp;P500 dropped 0.3% to close at 2,998</a:t>
+            </a:r>
+          </a:p>
+          <a:p>
+            <a:r>
+              <a:rPr lang="en-US" dirty="0" smtClean="0">
+                <a:solidFill>
+                  <a:srgbClr val="0070C0"/>
+                </a:solidFill>
+              </a:rPr>
+              <a:t>July 28 2019 (Sunday) had the highest sentiment.  When stocks opened on July 29 2019, S&amp;P500 rose 0.04%</a:t>
+            </a:r>
           </a:p>
           <a:p>
             <a:endParaRPr lang="en-US" dirty="0"/>
@@ -6571,7 +6629,7 @@
     </p:spTree>
     <p:extLst>
       <p:ext uri="{BB962C8B-B14F-4D97-AF65-F5344CB8AC3E}">
-        <p14:creationId xmlns:p14="http://schemas.microsoft.com/office/powerpoint/2010/main" val="1988904771"/>
+        <p14:creationId xmlns:p14="http://schemas.microsoft.com/office/powerpoint/2010/main" val="3474994011"/>
       </p:ext>
     </p:extLst>
   </p:cSld>
@@ -6640,6 +6698,179 @@
                   <a:srgbClr val="0070C0"/>
                 </a:solidFill>
               </a:rPr>
+              <a:t>Sentiment Analysis - Finance</a:t>
+            </a:r>
+            <a:endParaRPr lang="en-US" dirty="0">
+              <a:solidFill>
+                <a:srgbClr val="0070C0"/>
+              </a:solidFill>
+            </a:endParaRPr>
+          </a:p>
+        </p:txBody>
+      </p:sp>
+      <p:sp>
+        <p:nvSpPr>
+          <p:cNvPr id="3" name="Content Placeholder 2"/>
+          <p:cNvSpPr>
+            <a:spLocks noGrp="1"/>
+          </p:cNvSpPr>
+          <p:nvPr>
+            <p:ph idx="1"/>
+          </p:nvPr>
+        </p:nvSpPr>
+        <p:spPr/>
+        <p:txBody>
+          <a:bodyPr/>
+          <a:lstStyle/>
+          <a:p>
+            <a:r>
+              <a:rPr lang="en-US" dirty="0" smtClean="0">
+                <a:solidFill>
+                  <a:srgbClr val="0070C0"/>
+                </a:solidFill>
+              </a:rPr>
+              <a:t>Evidence that news sentiment impacts stocks is weak.  Monetizing is even harder</a:t>
+            </a:r>
+          </a:p>
+          <a:p>
+            <a:r>
+              <a:rPr lang="en-US" dirty="0" smtClean="0">
+                <a:solidFill>
+                  <a:srgbClr val="0070C0"/>
+                </a:solidFill>
+              </a:rPr>
+              <a:t>Possible reasons:</a:t>
+            </a:r>
+          </a:p>
+          <a:p>
+            <a:pPr lvl="1"/>
+            <a:r>
+              <a:rPr lang="en-US" dirty="0" smtClean="0">
+                <a:solidFill>
+                  <a:srgbClr val="0070C0"/>
+                </a:solidFill>
+              </a:rPr>
+              <a:t>“NLTK” is not trained for financial news sentiment</a:t>
+            </a:r>
+          </a:p>
+          <a:p>
+            <a:pPr lvl="1"/>
+            <a:r>
+              <a:rPr lang="en-US" dirty="0" smtClean="0">
+                <a:solidFill>
+                  <a:srgbClr val="0070C0"/>
+                </a:solidFill>
+              </a:rPr>
+              <a:t>Retail investors face many hurdles while trading</a:t>
+            </a:r>
+          </a:p>
+          <a:p>
+            <a:pPr lvl="1"/>
+            <a:r>
+              <a:rPr lang="en-US" dirty="0" smtClean="0">
+                <a:solidFill>
+                  <a:srgbClr val="0070C0"/>
+                </a:solidFill>
+              </a:rPr>
+              <a:t>The financial markets are already very efficient</a:t>
+            </a:r>
+          </a:p>
+          <a:p>
+            <a:pPr lvl="1"/>
+            <a:r>
+              <a:rPr lang="en-US" dirty="0" smtClean="0">
+                <a:solidFill>
+                  <a:srgbClr val="0070C0"/>
+                </a:solidFill>
+              </a:rPr>
+              <a:t>Stocks react to where reality materializes relative to prior expectations</a:t>
+            </a:r>
+          </a:p>
+          <a:p>
+            <a:pPr lvl="1"/>
+            <a:endParaRPr lang="en-US" dirty="0" smtClean="0">
+              <a:solidFill>
+                <a:srgbClr val="0070C0"/>
+              </a:solidFill>
+            </a:endParaRPr>
+          </a:p>
+          <a:p>
+            <a:endParaRPr lang="en-US" dirty="0"/>
+          </a:p>
+        </p:txBody>
+      </p:sp>
+    </p:spTree>
+    <p:extLst>
+      <p:ext uri="{BB962C8B-B14F-4D97-AF65-F5344CB8AC3E}">
+        <p14:creationId xmlns:p14="http://schemas.microsoft.com/office/powerpoint/2010/main" val="1988904771"/>
+      </p:ext>
+    </p:extLst>
+  </p:cSld>
+  <p:clrMapOvr>
+    <a:masterClrMapping/>
+  </p:clrMapOvr>
+  <p:timing>
+    <p:tnLst>
+      <p:par>
+        <p:cTn id="1" dur="indefinite" restart="never" nodeType="tmRoot"/>
+      </p:par>
+    </p:tnLst>
+  </p:timing>
+</p:sld>
+</file>
+
+<file path=ppt/slides/slide25.xml><?xml version="1.0" encoding="utf-8"?>
+<p:sld xmlns:a="http://schemas.openxmlformats.org/drawingml/2006/main" xmlns:r="http://schemas.openxmlformats.org/officeDocument/2006/relationships" xmlns:p="http://schemas.openxmlformats.org/presentationml/2006/main">
+  <p:cSld>
+    <p:bg>
+      <p:bgPr>
+        <a:blipFill dpi="0" rotWithShape="1">
+          <a:blip r:embed="rId2">
+            <a:lum/>
+          </a:blip>
+          <a:srcRect/>
+          <a:stretch>
+            <a:fillRect l="-7000" r="-7000"/>
+          </a:stretch>
+        </a:blipFill>
+        <a:effectLst/>
+      </p:bgPr>
+    </p:bg>
+    <p:spTree>
+      <p:nvGrpSpPr>
+        <p:cNvPr id="1" name=""/>
+        <p:cNvGrpSpPr/>
+        <p:nvPr/>
+      </p:nvGrpSpPr>
+      <p:grpSpPr>
+        <a:xfrm>
+          <a:off x="0" y="0"/>
+          <a:ext cx="0" cy="0"/>
+          <a:chOff x="0" y="0"/>
+          <a:chExt cx="0" cy="0"/>
+        </a:xfrm>
+      </p:grpSpPr>
+      <p:sp>
+        <p:nvSpPr>
+          <p:cNvPr id="2" name="Title 1"/>
+          <p:cNvSpPr>
+            <a:spLocks noGrp="1"/>
+          </p:cNvSpPr>
+          <p:nvPr>
+            <p:ph type="title"/>
+          </p:nvPr>
+        </p:nvSpPr>
+        <p:spPr/>
+        <p:txBody>
+          <a:bodyPr/>
+          <a:lstStyle/>
+          <a:p>
+            <a:r>
+              <a:rPr lang="en-US" dirty="0" smtClean="0">
+                <a:solidFill>
+                  <a:srgbClr val="0070C0"/>
+                </a:solidFill>
+              </a:rPr>
               <a:t>Natural Language Processing</a:t>
             </a:r>
             <a:endParaRPr lang="en-US" dirty="0">
@@ -6680,11 +6911,6 @@
               </a:rPr>
               <a:t>Advantage: many applications</a:t>
             </a:r>
-            <a:endParaRPr lang="en-US" dirty="0" smtClean="0">
-              <a:solidFill>
-                <a:srgbClr val="0070C0"/>
-              </a:solidFill>
-            </a:endParaRPr>
           </a:p>
           <a:p>
             <a:pPr lvl="1"/>
@@ -6804,6 +7030,145 @@
 </file>
 
 <file path=ppt/slides/slide3.xml><?xml version="1.0" encoding="utf-8"?>
+<p:sld xmlns:a="http://schemas.openxmlformats.org/drawingml/2006/main" xmlns:r="http://schemas.openxmlformats.org/officeDocument/2006/relationships" xmlns:p="http://schemas.openxmlformats.org/presentationml/2006/main">
+  <p:cSld>
+    <p:spTree>
+      <p:nvGrpSpPr>
+        <p:cNvPr id="1" name=""/>
+        <p:cNvGrpSpPr/>
+        <p:nvPr/>
+      </p:nvGrpSpPr>
+      <p:grpSpPr>
+        <a:xfrm>
+          <a:off x="0" y="0"/>
+          <a:ext cx="0" cy="0"/>
+          <a:chOff x="0" y="0"/>
+          <a:chExt cx="0" cy="0"/>
+        </a:xfrm>
+      </p:grpSpPr>
+      <p:sp>
+        <p:nvSpPr>
+          <p:cNvPr id="2" name="Title 1"/>
+          <p:cNvSpPr>
+            <a:spLocks noGrp="1"/>
+          </p:cNvSpPr>
+          <p:nvPr>
+            <p:ph type="title"/>
+          </p:nvPr>
+        </p:nvSpPr>
+        <p:spPr/>
+        <p:txBody>
+          <a:bodyPr/>
+          <a:lstStyle/>
+          <a:p>
+            <a:endParaRPr lang="en-US" dirty="0"/>
+          </a:p>
+        </p:txBody>
+      </p:sp>
+      <p:sp>
+        <p:nvSpPr>
+          <p:cNvPr id="3" name="Content Placeholder 2"/>
+          <p:cNvSpPr>
+            <a:spLocks noGrp="1"/>
+          </p:cNvSpPr>
+          <p:nvPr>
+            <p:ph idx="1"/>
+          </p:nvPr>
+        </p:nvSpPr>
+        <p:spPr/>
+        <p:txBody>
+          <a:bodyPr/>
+          <a:lstStyle/>
+          <a:p>
+            <a:endParaRPr lang="en-US" dirty="0"/>
+          </a:p>
+        </p:txBody>
+      </p:sp>
+      <p:pic>
+        <p:nvPicPr>
+          <p:cNvPr id="2050" name="Picture 2"/>
+          <p:cNvPicPr>
+            <a:picLocks noChangeAspect="1" noChangeArrowheads="1"/>
+          </p:cNvPicPr>
+          <p:nvPr/>
+        </p:nvPicPr>
+        <p:blipFill>
+          <a:blip r:embed="rId2">
+            <a:extLst>
+              <a:ext uri="{28A0092B-C50C-407E-A947-70E740481C1C}">
+                <a14:useLocalDpi xmlns:a14="http://schemas.microsoft.com/office/drawing/2010/main" val="0"/>
+              </a:ext>
+            </a:extLst>
+          </a:blip>
+          <a:srcRect/>
+          <a:stretch>
+            <a:fillRect/>
+          </a:stretch>
+        </p:blipFill>
+        <p:spPr bwMode="auto">
+          <a:xfrm>
+            <a:off x="-37564" y="0"/>
+            <a:ext cx="10301653" cy="6858000"/>
+          </a:xfrm>
+          <a:prstGeom prst="rect">
+            <a:avLst/>
+          </a:prstGeom>
+          <a:noFill/>
+          <a:ln>
+            <a:noFill/>
+          </a:ln>
+          <a:effectLst/>
+          <a:extLst>
+            <a:ext uri="{909E8E84-426E-40DD-AFC4-6F175D3DCCD1}">
+              <a14:hiddenFill xmlns:a14="http://schemas.microsoft.com/office/drawing/2010/main">
+                <a:solidFill>
+                  <a:schemeClr val="accent1"/>
+                </a:solidFill>
+              </a14:hiddenFill>
+            </a:ext>
+            <a:ext uri="{91240B29-F687-4F45-9708-019B960494DF}">
+              <a14:hiddenLine xmlns:a14="http://schemas.microsoft.com/office/drawing/2010/main" w="9525">
+                <a:solidFill>
+                  <a:schemeClr val="tx1"/>
+                </a:solidFill>
+                <a:miter lim="800000"/>
+                <a:headEnd/>
+                <a:tailEnd/>
+              </a14:hiddenLine>
+            </a:ext>
+            <a:ext uri="{AF507438-7753-43E0-B8FC-AC1667EBCBE1}">
+              <a14:hiddenEffects xmlns:a14="http://schemas.microsoft.com/office/drawing/2010/main">
+                <a:effectLst>
+                  <a:outerShdw dist="35921" dir="2700000" algn="ctr" rotWithShape="0">
+                    <a:schemeClr val="bg2"/>
+                  </a:outerShdw>
+                </a:effectLst>
+              </a14:hiddenEffects>
+            </a:ext>
+          </a:extLst>
+        </p:spPr>
+      </p:pic>
+    </p:spTree>
+    <p:extLst>
+      <p:ext uri="{BB962C8B-B14F-4D97-AF65-F5344CB8AC3E}">
+        <p14:creationId xmlns:p14="http://schemas.microsoft.com/office/powerpoint/2010/main" val="4006753724"/>
+      </p:ext>
+    </p:extLst>
+  </p:cSld>
+  <p:clrMapOvr>
+    <a:masterClrMapping/>
+  </p:clrMapOvr>
+  <p:timing>
+    <p:tnLst>
+      <p:par>
+        <p:cTn id="1" dur="indefinite" restart="never" nodeType="tmRoot"/>
+      </p:par>
+    </p:tnLst>
+  </p:timing>
+</p:sld>
+</file>
+
+<file path=ppt/slides/slide4.xml><?xml version="1.0" encoding="utf-8"?>
 <p:sld xmlns:a="http://schemas.openxmlformats.org/drawingml/2006/main" xmlns:r="http://schemas.openxmlformats.org/officeDocument/2006/relationships" xmlns:p="http://schemas.openxmlformats.org/presentationml/2006/main">
   <p:cSld>
     <p:spTree>
@@ -7107,7 +7472,7 @@
 </p:sld>
 </file>
 
-<file path=ppt/slides/slide4.xml><?xml version="1.0" encoding="utf-8"?>
+<file path=ppt/slides/slide5.xml><?xml version="1.0" encoding="utf-8"?>
 <p:sld xmlns:a="http://schemas.openxmlformats.org/drawingml/2006/main" xmlns:r="http://schemas.openxmlformats.org/officeDocument/2006/relationships" xmlns:p="http://schemas.openxmlformats.org/presentationml/2006/main">
   <p:cSld>
     <p:spTree>
@@ -7324,7 +7689,7 @@
 </p:sld>
 </file>
 
-<file path=ppt/slides/slide5.xml><?xml version="1.0" encoding="utf-8"?>
+<file path=ppt/slides/slide6.xml><?xml version="1.0" encoding="utf-8"?>
 <p:sld xmlns:a="http://schemas.openxmlformats.org/drawingml/2006/main" xmlns:r="http://schemas.openxmlformats.org/officeDocument/2006/relationships" xmlns:p="http://schemas.openxmlformats.org/presentationml/2006/main">
   <p:cSld>
     <p:spTree>
@@ -7555,7 +7920,7 @@
 </p:sld>
 </file>
 
-<file path=ppt/slides/slide6.xml><?xml version="1.0" encoding="utf-8"?>
+<file path=ppt/slides/slide7.xml><?xml version="1.0" encoding="utf-8"?>
 <p:sld xmlns:a="http://schemas.openxmlformats.org/drawingml/2006/main" xmlns:r="http://schemas.openxmlformats.org/officeDocument/2006/relationships" xmlns:p="http://schemas.openxmlformats.org/presentationml/2006/main">
   <p:cSld>
     <p:bg>
@@ -7765,7 +8130,7 @@
 </p:sld>
 </file>
 
-<file path=ppt/slides/slide7.xml><?xml version="1.0" encoding="utf-8"?>
+<file path=ppt/slides/slide8.xml><?xml version="1.0" encoding="utf-8"?>
 <p:sld xmlns:a="http://schemas.openxmlformats.org/drawingml/2006/main" xmlns:r="http://schemas.openxmlformats.org/officeDocument/2006/relationships" xmlns:p="http://schemas.openxmlformats.org/presentationml/2006/main">
   <p:cSld>
     <p:spTree>
@@ -7907,7 +8272,7 @@
 </p:sld>
 </file>
 
-<file path=ppt/slides/slide8.xml><?xml version="1.0" encoding="utf-8"?>
+<file path=ppt/slides/slide9.xml><?xml version="1.0" encoding="utf-8"?>
 <p:sld xmlns:a="http://schemas.openxmlformats.org/drawingml/2006/main" xmlns:r="http://schemas.openxmlformats.org/officeDocument/2006/relationships" xmlns:p="http://schemas.openxmlformats.org/presentationml/2006/main">
   <p:cSld>
     <p:spTree>
@@ -8071,186 +8436,6 @@
     <p:extLst>
       <p:ext uri="{BB962C8B-B14F-4D97-AF65-F5344CB8AC3E}">
         <p14:creationId xmlns:p14="http://schemas.microsoft.com/office/powerpoint/2010/main" val="4278694418"/>
-      </p:ext>
-    </p:extLst>
-  </p:cSld>
-  <p:clrMapOvr>
-    <a:masterClrMapping/>
-  </p:clrMapOvr>
-  <p:timing>
-    <p:tnLst>
-      <p:par>
-        <p:cTn id="1" dur="indefinite" restart="never" nodeType="tmRoot"/>
-      </p:par>
-    </p:tnLst>
-  </p:timing>
-</p:sld>
-</file>
-
-<file path=ppt/slides/slide9.xml><?xml version="1.0" encoding="utf-8"?>
-<p:sld xmlns:a="http://schemas.openxmlformats.org/drawingml/2006/main" xmlns:r="http://schemas.openxmlformats.org/officeDocument/2006/relationships" xmlns:p="http://schemas.openxmlformats.org/presentationml/2006/main">
-  <p:cSld>
-    <p:spTree>
-      <p:nvGrpSpPr>
-        <p:cNvPr id="1" name=""/>
-        <p:cNvGrpSpPr/>
-        <p:nvPr/>
-      </p:nvGrpSpPr>
-      <p:grpSpPr>
-        <a:xfrm>
-          <a:off x="0" y="0"/>
-          <a:ext cx="0" cy="0"/>
-          <a:chOff x="0" y="0"/>
-          <a:chExt cx="0" cy="0"/>
-        </a:xfrm>
-      </p:grpSpPr>
-      <p:sp>
-        <p:nvSpPr>
-          <p:cNvPr id="7" name="Content Placeholder 6"/>
-          <p:cNvSpPr>
-            <a:spLocks noGrp="1"/>
-          </p:cNvSpPr>
-          <p:nvPr>
-            <p:ph idx="1"/>
-          </p:nvPr>
-        </p:nvSpPr>
-        <p:spPr>
-          <a:xfrm>
-            <a:off x="417455" y="5829014"/>
-            <a:ext cx="8229600" cy="1020763"/>
-          </a:xfrm>
-        </p:spPr>
-        <p:txBody>
-          <a:bodyPr>
-            <a:normAutofit lnSpcReduction="10000"/>
-          </a:bodyPr>
-          <a:lstStyle/>
-          <a:p>
-            <a:r>
-              <a:rPr lang="en-US" dirty="0" smtClean="0">
-                <a:solidFill>
-                  <a:srgbClr val="0070C0"/>
-                </a:solidFill>
-              </a:rPr>
-              <a:t>Aug 25, 2019: Trump regrets not raising tariffs higher on China</a:t>
-            </a:r>
-            <a:endParaRPr lang="en-US" dirty="0">
-              <a:solidFill>
-                <a:srgbClr val="0070C0"/>
-              </a:solidFill>
-            </a:endParaRPr>
-          </a:p>
-        </p:txBody>
-      </p:sp>
-      <p:pic>
-        <p:nvPicPr>
-          <p:cNvPr id="6146" name="Picture 2" descr="C:\MAIN\NYCDSA\Web_Scraping_Project\Graphic - Appearance of word china.png"/>
-          <p:cNvPicPr>
-            <a:picLocks noChangeAspect="1" noChangeArrowheads="1"/>
-          </p:cNvPicPr>
-          <p:nvPr/>
-        </p:nvPicPr>
-        <p:blipFill>
-          <a:blip r:embed="rId2">
-            <a:extLst>
-              <a:ext uri="{28A0092B-C50C-407E-A947-70E740481C1C}">
-                <a14:useLocalDpi xmlns:a14="http://schemas.microsoft.com/office/drawing/2010/main" val="0"/>
-              </a:ext>
-            </a:extLst>
-          </a:blip>
-          <a:srcRect/>
-          <a:stretch>
-            <a:fillRect/>
-          </a:stretch>
-        </p:blipFill>
-        <p:spPr bwMode="auto">
-          <a:xfrm>
-            <a:off x="0" y="76200"/>
-            <a:ext cx="9067800" cy="5800497"/>
-          </a:xfrm>
-          <a:prstGeom prst="rect">
-            <a:avLst/>
-          </a:prstGeom>
-          <a:noFill/>
-          <a:extLst>
-            <a:ext uri="{909E8E84-426E-40DD-AFC4-6F175D3DCCD1}">
-              <a14:hiddenFill xmlns:a14="http://schemas.microsoft.com/office/drawing/2010/main">
-                <a:solidFill>
-                  <a:srgbClr val="FFFFFF"/>
-                </a:solidFill>
-              </a14:hiddenFill>
-            </a:ext>
-          </a:extLst>
-        </p:spPr>
-      </p:pic>
-      <p:pic>
-        <p:nvPicPr>
-          <p:cNvPr id="5" name="Picture 2"/>
-          <p:cNvPicPr>
-            <a:picLocks noChangeAspect="1" noChangeArrowheads="1"/>
-          </p:cNvPicPr>
-          <p:nvPr/>
-        </p:nvPicPr>
-        <p:blipFill>
-          <a:blip r:embed="rId3">
-            <a:extLst>
-              <a:ext uri="{28A0092B-C50C-407E-A947-70E740481C1C}">
-                <a14:useLocalDpi xmlns:a14="http://schemas.microsoft.com/office/drawing/2010/main" val="0"/>
-              </a:ext>
-            </a:extLst>
-          </a:blip>
-          <a:srcRect/>
-          <a:stretch>
-            <a:fillRect/>
-          </a:stretch>
-        </p:blipFill>
-        <p:spPr bwMode="auto">
-          <a:xfrm>
-            <a:off x="7467600" y="457200"/>
-            <a:ext cx="1428750" cy="1428750"/>
-          </a:xfrm>
-          <a:prstGeom prst="rect">
-            <a:avLst/>
-          </a:prstGeom>
-          <a:noFill/>
-          <a:ln>
-            <a:noFill/>
-          </a:ln>
-          <a:effectLst/>
-          <a:extLst>
-            <a:ext uri="{909E8E84-426E-40DD-AFC4-6F175D3DCCD1}">
-              <a14:hiddenFill xmlns:a14="http://schemas.microsoft.com/office/drawing/2010/main">
-                <a:solidFill>
-                  <a:schemeClr val="accent1"/>
-                </a:solidFill>
-              </a14:hiddenFill>
-            </a:ext>
-            <a:ext uri="{91240B29-F687-4F45-9708-019B960494DF}">
-              <a14:hiddenLine xmlns:a14="http://schemas.microsoft.com/office/drawing/2010/main" w="9525">
-                <a:solidFill>
-                  <a:schemeClr val="tx1"/>
-                </a:solidFill>
-                <a:miter lim="800000"/>
-                <a:headEnd/>
-                <a:tailEnd/>
-              </a14:hiddenLine>
-            </a:ext>
-            <a:ext uri="{AF507438-7753-43E0-B8FC-AC1667EBCBE1}">
-              <a14:hiddenEffects xmlns:a14="http://schemas.microsoft.com/office/drawing/2010/main">
-                <a:effectLst>
-                  <a:outerShdw dist="35921" dir="2700000" algn="ctr" rotWithShape="0">
-                    <a:schemeClr val="bg2"/>
-                  </a:outerShdw>
-                </a:effectLst>
-              </a14:hiddenEffects>
-            </a:ext>
-          </a:extLst>
-        </p:spPr>
-      </p:pic>
-    </p:spTree>
-    <p:extLst>
-      <p:ext uri="{BB962C8B-B14F-4D97-AF65-F5344CB8AC3E}">
-        <p14:creationId xmlns:p14="http://schemas.microsoft.com/office/powerpoint/2010/main" val="3752115146"/>
       </p:ext>
     </p:extLst>
   </p:cSld>

</xml_diff>